<commit_message>
Added Slides, added screenshots and dashboard templates
</commit_message>
<xml_diff>
--- a/EngineeredMonitoringPlatform/docs/EMP_PresentationSlides.pptx
+++ b/EngineeredMonitoringPlatform/docs/EMP_PresentationSlides.pptx
@@ -21,8 +21,11 @@
     <p:sldId id="263" r:id="rId15"/>
     <p:sldId id="264" r:id="rId16"/>
     <p:sldId id="271" r:id="rId17"/>
-    <p:sldId id="272" r:id="rId18"/>
+    <p:sldId id="276" r:id="rId18"/>
     <p:sldId id="273" r:id="rId19"/>
+    <p:sldId id="272" r:id="rId20"/>
+    <p:sldId id="275" r:id="rId21"/>
+    <p:sldId id="274" r:id="rId22"/>
   </p:sldIdLst>
   <p:sldSz cx="12192000" cy="6858000"/>
   <p:notesSz cx="6858000" cy="9144000"/>
@@ -4400,6 +4403,258 @@
       </p:grpSpPr>
       <p:sp>
         <p:nvSpPr>
+          <p:cNvPr id="2" name="Title 1">
+            <a:extLst>
+              <a:ext uri="{FF2B5EF4-FFF2-40B4-BE49-F238E27FC236}">
+                <a16:creationId xmlns:a16="http://schemas.microsoft.com/office/drawing/2014/main" id="{CCE9F001-422D-41D2-B0B0-44D45D916CA6}"/>
+              </a:ext>
+            </a:extLst>
+          </p:cNvPr>
+          <p:cNvSpPr>
+            <a:spLocks noGrp="1"/>
+          </p:cNvSpPr>
+          <p:nvPr>
+            <p:ph type="title"/>
+          </p:nvPr>
+        </p:nvSpPr>
+        <p:spPr/>
+        <p:txBody>
+          <a:bodyPr/>
+          <a:lstStyle/>
+          <a:p>
+            <a:r>
+              <a:rPr lang="en-US" dirty="0"/>
+              <a:t>Example – Self Monitoring</a:t>
+            </a:r>
+            <a:endParaRPr lang="LID4096" dirty="0"/>
+          </a:p>
+        </p:txBody>
+      </p:sp>
+      <p:sp>
+        <p:nvSpPr>
+          <p:cNvPr id="3" name="Content Placeholder 2">
+            <a:extLst>
+              <a:ext uri="{FF2B5EF4-FFF2-40B4-BE49-F238E27FC236}">
+                <a16:creationId xmlns:a16="http://schemas.microsoft.com/office/drawing/2014/main" id="{CB15881A-5069-4285-97F3-5453BC930157}"/>
+              </a:ext>
+            </a:extLst>
+          </p:cNvPr>
+          <p:cNvSpPr>
+            <a:spLocks noGrp="1"/>
+          </p:cNvSpPr>
+          <p:nvPr>
+            <p:ph idx="1"/>
+          </p:nvPr>
+        </p:nvSpPr>
+        <p:spPr/>
+        <p:txBody>
+          <a:bodyPr>
+            <a:normAutofit fontScale="85000" lnSpcReduction="20000"/>
+          </a:bodyPr>
+          <a:lstStyle/>
+          <a:p>
+            <a:r>
+              <a:rPr lang="en-US" dirty="0"/>
+              <a:t>EMP has a Prometheus endpoint(/metrics) and we can create a dashboard to</a:t>
+            </a:r>
+          </a:p>
+          <a:p>
+            <a:r>
+              <a:rPr lang="en-US" dirty="0"/>
+              <a:t>self-monitor the application(importable template available).</a:t>
+            </a:r>
+            <a:endParaRPr lang="LID4096" dirty="0"/>
+          </a:p>
+        </p:txBody>
+      </p:sp>
+      <p:pic>
+        <p:nvPicPr>
+          <p:cNvPr id="7" name="Picture 6">
+            <a:extLst>
+              <a:ext uri="{FF2B5EF4-FFF2-40B4-BE49-F238E27FC236}">
+                <a16:creationId xmlns:a16="http://schemas.microsoft.com/office/drawing/2014/main" id="{1E253B14-859A-4A12-B362-332BDE13F21B}"/>
+              </a:ext>
+            </a:extLst>
+          </p:cNvPr>
+          <p:cNvPicPr>
+            <a:picLocks noChangeAspect="1"/>
+          </p:cNvPicPr>
+          <p:nvPr/>
+        </p:nvPicPr>
+        <p:blipFill>
+          <a:blip r:embed="rId2">
+            <a:extLst>
+              <a:ext uri="{28A0092B-C50C-407E-A947-70E740481C1C}">
+                <a14:useLocalDpi xmlns:a14="http://schemas.microsoft.com/office/drawing/2010/main" val="0"/>
+              </a:ext>
+            </a:extLst>
+          </a:blip>
+          <a:stretch>
+            <a:fillRect/>
+          </a:stretch>
+        </p:blipFill>
+        <p:spPr>
+          <a:xfrm>
+            <a:off x="1910080" y="2223284"/>
+            <a:ext cx="8056880" cy="4327872"/>
+          </a:xfrm>
+          <a:prstGeom prst="rect">
+            <a:avLst/>
+          </a:prstGeom>
+        </p:spPr>
+      </p:pic>
+    </p:spTree>
+    <p:extLst>
+      <p:ext uri="{BB962C8B-B14F-4D97-AF65-F5344CB8AC3E}">
+        <p14:creationId xmlns:p14="http://schemas.microsoft.com/office/powerpoint/2010/main" val="1094116404"/>
+      </p:ext>
+    </p:extLst>
+  </p:cSld>
+  <p:clrMapOvr>
+    <a:masterClrMapping/>
+  </p:clrMapOvr>
+</p:sld>
+</file>
+
+<file path=ppt/slides/slide18.xml><?xml version="1.0" encoding="utf-8"?>
+<p:sld xmlns:a="http://schemas.openxmlformats.org/drawingml/2006/main" xmlns:r="http://schemas.openxmlformats.org/officeDocument/2006/relationships" xmlns:p="http://schemas.openxmlformats.org/presentationml/2006/main">
+  <p:cSld>
+    <p:spTree>
+      <p:nvGrpSpPr>
+        <p:cNvPr id="1" name=""/>
+        <p:cNvGrpSpPr/>
+        <p:nvPr/>
+      </p:nvGrpSpPr>
+      <p:grpSpPr>
+        <a:xfrm>
+          <a:off x="0" y="0"/>
+          <a:ext cx="0" cy="0"/>
+          <a:chOff x="0" y="0"/>
+          <a:chExt cx="0" cy="0"/>
+        </a:xfrm>
+      </p:grpSpPr>
+      <p:sp>
+        <p:nvSpPr>
+          <p:cNvPr id="2" name="Title 1">
+            <a:extLst>
+              <a:ext uri="{FF2B5EF4-FFF2-40B4-BE49-F238E27FC236}">
+                <a16:creationId xmlns:a16="http://schemas.microsoft.com/office/drawing/2014/main" id="{CCE9F001-422D-41D2-B0B0-44D45D916CA6}"/>
+              </a:ext>
+            </a:extLst>
+          </p:cNvPr>
+          <p:cNvSpPr>
+            <a:spLocks noGrp="1"/>
+          </p:cNvSpPr>
+          <p:nvPr>
+            <p:ph type="title"/>
+          </p:nvPr>
+        </p:nvSpPr>
+        <p:spPr/>
+        <p:txBody>
+          <a:bodyPr/>
+          <a:lstStyle/>
+          <a:p>
+            <a:r>
+              <a:rPr lang="en-US" dirty="0"/>
+              <a:t>Example – Query MySQL</a:t>
+            </a:r>
+            <a:endParaRPr lang="LID4096" dirty="0"/>
+          </a:p>
+        </p:txBody>
+      </p:sp>
+      <p:sp>
+        <p:nvSpPr>
+          <p:cNvPr id="3" name="Content Placeholder 2">
+            <a:extLst>
+              <a:ext uri="{FF2B5EF4-FFF2-40B4-BE49-F238E27FC236}">
+                <a16:creationId xmlns:a16="http://schemas.microsoft.com/office/drawing/2014/main" id="{CB15881A-5069-4285-97F3-5453BC930157}"/>
+              </a:ext>
+            </a:extLst>
+          </p:cNvPr>
+          <p:cNvSpPr>
+            <a:spLocks noGrp="1"/>
+          </p:cNvSpPr>
+          <p:nvPr>
+            <p:ph idx="1"/>
+          </p:nvPr>
+        </p:nvSpPr>
+        <p:spPr/>
+        <p:txBody>
+          <a:bodyPr>
+            <a:normAutofit fontScale="92500" lnSpcReduction="10000"/>
+          </a:bodyPr>
+          <a:lstStyle/>
+          <a:p>
+            <a:r>
+              <a:rPr lang="en-US" dirty="0"/>
+              <a:t>Query Records from a Database with a simple query. Check if the value of a specific column reaches a defined threshold and set the color appropriately:</a:t>
+            </a:r>
+            <a:endParaRPr lang="LID4096" dirty="0"/>
+          </a:p>
+        </p:txBody>
+      </p:sp>
+      <p:pic>
+        <p:nvPicPr>
+          <p:cNvPr id="5" name="Picture 4">
+            <a:extLst>
+              <a:ext uri="{FF2B5EF4-FFF2-40B4-BE49-F238E27FC236}">
+                <a16:creationId xmlns:a16="http://schemas.microsoft.com/office/drawing/2014/main" id="{2340FC03-CF5D-4247-998C-49AA412A5808}"/>
+              </a:ext>
+            </a:extLst>
+          </p:cNvPr>
+          <p:cNvPicPr>
+            <a:picLocks noChangeAspect="1"/>
+          </p:cNvPicPr>
+          <p:nvPr/>
+        </p:nvPicPr>
+        <p:blipFill>
+          <a:blip r:embed="rId2"/>
+          <a:stretch>
+            <a:fillRect/>
+          </a:stretch>
+        </p:blipFill>
+        <p:spPr>
+          <a:xfrm>
+            <a:off x="1922780" y="2276477"/>
+            <a:ext cx="8346440" cy="3947335"/>
+          </a:xfrm>
+          <a:prstGeom prst="rect">
+            <a:avLst/>
+          </a:prstGeom>
+        </p:spPr>
+      </p:pic>
+    </p:spTree>
+    <p:extLst>
+      <p:ext uri="{BB962C8B-B14F-4D97-AF65-F5344CB8AC3E}">
+        <p14:creationId xmlns:p14="http://schemas.microsoft.com/office/powerpoint/2010/main" val="1664385213"/>
+      </p:ext>
+    </p:extLst>
+  </p:cSld>
+  <p:clrMapOvr>
+    <a:masterClrMapping/>
+  </p:clrMapOvr>
+</p:sld>
+</file>
+
+<file path=ppt/slides/slide19.xml><?xml version="1.0" encoding="utf-8"?>
+<p:sld xmlns:a="http://schemas.openxmlformats.org/drawingml/2006/main" xmlns:r="http://schemas.openxmlformats.org/officeDocument/2006/relationships" xmlns:p="http://schemas.openxmlformats.org/presentationml/2006/main">
+  <p:cSld>
+    <p:spTree>
+      <p:nvGrpSpPr>
+        <p:cNvPr id="1" name=""/>
+        <p:cNvGrpSpPr/>
+        <p:nvPr/>
+      </p:nvGrpSpPr>
+      <p:grpSpPr>
+        <a:xfrm>
+          <a:off x="0" y="0"/>
+          <a:ext cx="0" cy="0"/>
+          <a:chOff x="0" y="0"/>
+          <a:chExt cx="0" cy="0"/>
+        </a:xfrm>
+      </p:grpSpPr>
+      <p:sp>
+        <p:nvSpPr>
           <p:cNvPr id="4" name="Title 3">
             <a:extLst>
               <a:ext uri="{FF2B5EF4-FFF2-40B4-BE49-F238E27FC236}">
@@ -4506,126 +4761,6 @@
 </p:sld>
 </file>
 
-<file path=ppt/slides/slide18.xml><?xml version="1.0" encoding="utf-8"?>
-<p:sld xmlns:a="http://schemas.openxmlformats.org/drawingml/2006/main" xmlns:r="http://schemas.openxmlformats.org/officeDocument/2006/relationships" xmlns:p="http://schemas.openxmlformats.org/presentationml/2006/main">
-  <p:cSld>
-    <p:spTree>
-      <p:nvGrpSpPr>
-        <p:cNvPr id="1" name=""/>
-        <p:cNvGrpSpPr/>
-        <p:nvPr/>
-      </p:nvGrpSpPr>
-      <p:grpSpPr>
-        <a:xfrm>
-          <a:off x="0" y="0"/>
-          <a:ext cx="0" cy="0"/>
-          <a:chOff x="0" y="0"/>
-          <a:chExt cx="0" cy="0"/>
-        </a:xfrm>
-      </p:grpSpPr>
-      <p:sp>
-        <p:nvSpPr>
-          <p:cNvPr id="2" name="Title 1">
-            <a:extLst>
-              <a:ext uri="{FF2B5EF4-FFF2-40B4-BE49-F238E27FC236}">
-                <a16:creationId xmlns:a16="http://schemas.microsoft.com/office/drawing/2014/main" id="{CCE9F001-422D-41D2-B0B0-44D45D916CA6}"/>
-              </a:ext>
-            </a:extLst>
-          </p:cNvPr>
-          <p:cNvSpPr>
-            <a:spLocks noGrp="1"/>
-          </p:cNvSpPr>
-          <p:nvPr>
-            <p:ph type="title"/>
-          </p:nvPr>
-        </p:nvSpPr>
-        <p:spPr/>
-        <p:txBody>
-          <a:bodyPr/>
-          <a:lstStyle/>
-          <a:p>
-            <a:r>
-              <a:rPr lang="en-US" dirty="0"/>
-              <a:t>Example – Query MySQL</a:t>
-            </a:r>
-            <a:endParaRPr lang="LID4096" dirty="0"/>
-          </a:p>
-        </p:txBody>
-      </p:sp>
-      <p:sp>
-        <p:nvSpPr>
-          <p:cNvPr id="3" name="Content Placeholder 2">
-            <a:extLst>
-              <a:ext uri="{FF2B5EF4-FFF2-40B4-BE49-F238E27FC236}">
-                <a16:creationId xmlns:a16="http://schemas.microsoft.com/office/drawing/2014/main" id="{CB15881A-5069-4285-97F3-5453BC930157}"/>
-              </a:ext>
-            </a:extLst>
-          </p:cNvPr>
-          <p:cNvSpPr>
-            <a:spLocks noGrp="1"/>
-          </p:cNvSpPr>
-          <p:nvPr>
-            <p:ph idx="1"/>
-          </p:nvPr>
-        </p:nvSpPr>
-        <p:spPr/>
-        <p:txBody>
-          <a:bodyPr>
-            <a:normAutofit fontScale="92500" lnSpcReduction="10000"/>
-          </a:bodyPr>
-          <a:lstStyle/>
-          <a:p>
-            <a:r>
-              <a:rPr lang="en-US" dirty="0"/>
-              <a:t>Query Records from a Database with a simple query. Check if the value of a specific column reaches a defined threshold and set the color appropriately:</a:t>
-            </a:r>
-            <a:endParaRPr lang="LID4096" dirty="0"/>
-          </a:p>
-        </p:txBody>
-      </p:sp>
-      <p:pic>
-        <p:nvPicPr>
-          <p:cNvPr id="5" name="Picture 4">
-            <a:extLst>
-              <a:ext uri="{FF2B5EF4-FFF2-40B4-BE49-F238E27FC236}">
-                <a16:creationId xmlns:a16="http://schemas.microsoft.com/office/drawing/2014/main" id="{2340FC03-CF5D-4247-998C-49AA412A5808}"/>
-              </a:ext>
-            </a:extLst>
-          </p:cNvPr>
-          <p:cNvPicPr>
-            <a:picLocks noChangeAspect="1"/>
-          </p:cNvPicPr>
-          <p:nvPr/>
-        </p:nvPicPr>
-        <p:blipFill>
-          <a:blip r:embed="rId2"/>
-          <a:stretch>
-            <a:fillRect/>
-          </a:stretch>
-        </p:blipFill>
-        <p:spPr>
-          <a:xfrm>
-            <a:off x="1922780" y="2276477"/>
-            <a:ext cx="8346440" cy="3947335"/>
-          </a:xfrm>
-          <a:prstGeom prst="rect">
-            <a:avLst/>
-          </a:prstGeom>
-        </p:spPr>
-      </p:pic>
-    </p:spTree>
-    <p:extLst>
-      <p:ext uri="{BB962C8B-B14F-4D97-AF65-F5344CB8AC3E}">
-        <p14:creationId xmlns:p14="http://schemas.microsoft.com/office/powerpoint/2010/main" val="1664385213"/>
-      </p:ext>
-    </p:extLst>
-  </p:cSld>
-  <p:clrMapOvr>
-    <a:masterClrMapping/>
-  </p:clrMapOvr>
-</p:sld>
-</file>
-
 <file path=ppt/slides/slide2.xml><?xml version="1.0" encoding="utf-8"?>
 <p:sld xmlns:a="http://schemas.openxmlformats.org/drawingml/2006/main" xmlns:r="http://schemas.openxmlformats.org/officeDocument/2006/relationships" xmlns:p="http://schemas.openxmlformats.org/presentationml/2006/main">
   <p:cSld>
@@ -4760,6 +4895,218 @@
     <p:extLst>
       <p:ext uri="{BB962C8B-B14F-4D97-AF65-F5344CB8AC3E}">
         <p14:creationId xmlns:p14="http://schemas.microsoft.com/office/powerpoint/2010/main" val="785578117"/>
+      </p:ext>
+    </p:extLst>
+  </p:cSld>
+  <p:clrMapOvr>
+    <a:masterClrMapping/>
+  </p:clrMapOvr>
+</p:sld>
+</file>
+
+<file path=ppt/slides/slide20.xml><?xml version="1.0" encoding="utf-8"?>
+<p:sld xmlns:a="http://schemas.openxmlformats.org/drawingml/2006/main" xmlns:r="http://schemas.openxmlformats.org/officeDocument/2006/relationships" xmlns:p="http://schemas.openxmlformats.org/presentationml/2006/main">
+  <p:cSld>
+    <p:spTree>
+      <p:nvGrpSpPr>
+        <p:cNvPr id="1" name=""/>
+        <p:cNvGrpSpPr/>
+        <p:nvPr/>
+      </p:nvGrpSpPr>
+      <p:grpSpPr>
+        <a:xfrm>
+          <a:off x="0" y="0"/>
+          <a:ext cx="0" cy="0"/>
+          <a:chOff x="0" y="0"/>
+          <a:chExt cx="0" cy="0"/>
+        </a:xfrm>
+      </p:grpSpPr>
+      <p:sp>
+        <p:nvSpPr>
+          <p:cNvPr id="2" name="Title 1">
+            <a:extLst>
+              <a:ext uri="{FF2B5EF4-FFF2-40B4-BE49-F238E27FC236}">
+                <a16:creationId xmlns:a16="http://schemas.microsoft.com/office/drawing/2014/main" id="{CCE9F001-422D-41D2-B0B0-44D45D916CA6}"/>
+              </a:ext>
+            </a:extLst>
+          </p:cNvPr>
+          <p:cNvSpPr>
+            <a:spLocks noGrp="1"/>
+          </p:cNvSpPr>
+          <p:nvPr>
+            <p:ph type="title"/>
+          </p:nvPr>
+        </p:nvSpPr>
+        <p:spPr/>
+        <p:txBody>
+          <a:bodyPr/>
+          <a:lstStyle/>
+          <a:p>
+            <a:r>
+              <a:rPr lang="en-US" dirty="0"/>
+              <a:t>Example – Dynatrace Host Analysis</a:t>
+            </a:r>
+            <a:endParaRPr lang="LID4096" dirty="0"/>
+          </a:p>
+        </p:txBody>
+      </p:sp>
+      <p:sp>
+        <p:nvSpPr>
+          <p:cNvPr id="3" name="Content Placeholder 2">
+            <a:extLst>
+              <a:ext uri="{FF2B5EF4-FFF2-40B4-BE49-F238E27FC236}">
+                <a16:creationId xmlns:a16="http://schemas.microsoft.com/office/drawing/2014/main" id="{CB15881A-5069-4285-97F3-5453BC930157}"/>
+              </a:ext>
+            </a:extLst>
+          </p:cNvPr>
+          <p:cNvSpPr>
+            <a:spLocks noGrp="1"/>
+          </p:cNvSpPr>
+          <p:nvPr>
+            <p:ph idx="1"/>
+          </p:nvPr>
+        </p:nvSpPr>
+        <p:spPr/>
+        <p:txBody>
+          <a:bodyPr>
+            <a:normAutofit fontScale="85000" lnSpcReduction="20000"/>
+          </a:bodyPr>
+          <a:lstStyle/>
+          <a:p>
+            <a:r>
+              <a:rPr lang="en-US" dirty="0"/>
+              <a:t>Parameterized dashboard to analyze host metrics from Dynatrace.</a:t>
+            </a:r>
+          </a:p>
+          <a:p>
+            <a:r>
+              <a:rPr lang="en-US" dirty="0"/>
+              <a:t>This is included as a template that can be imported:</a:t>
+            </a:r>
+            <a:endParaRPr lang="LID4096" dirty="0"/>
+          </a:p>
+        </p:txBody>
+      </p:sp>
+      <p:pic>
+        <p:nvPicPr>
+          <p:cNvPr id="6" name="Picture 5">
+            <a:extLst>
+              <a:ext uri="{FF2B5EF4-FFF2-40B4-BE49-F238E27FC236}">
+                <a16:creationId xmlns:a16="http://schemas.microsoft.com/office/drawing/2014/main" id="{561C0D25-8CF3-4C36-B0D6-6C3465A877FF}"/>
+              </a:ext>
+            </a:extLst>
+          </p:cNvPr>
+          <p:cNvPicPr>
+            <a:picLocks noChangeAspect="1"/>
+          </p:cNvPicPr>
+          <p:nvPr/>
+        </p:nvPicPr>
+        <p:blipFill>
+          <a:blip r:embed="rId2">
+            <a:extLst>
+              <a:ext uri="{28A0092B-C50C-407E-A947-70E740481C1C}">
+                <a14:useLocalDpi xmlns:a14="http://schemas.microsoft.com/office/drawing/2010/main" val="0"/>
+              </a:ext>
+            </a:extLst>
+          </a:blip>
+          <a:stretch>
+            <a:fillRect/>
+          </a:stretch>
+        </p:blipFill>
+        <p:spPr>
+          <a:xfrm>
+            <a:off x="1928282" y="2249096"/>
+            <a:ext cx="7916758" cy="4243779"/>
+          </a:xfrm>
+          <a:prstGeom prst="rect">
+            <a:avLst/>
+          </a:prstGeom>
+        </p:spPr>
+      </p:pic>
+    </p:spTree>
+    <p:extLst>
+      <p:ext uri="{BB962C8B-B14F-4D97-AF65-F5344CB8AC3E}">
+        <p14:creationId xmlns:p14="http://schemas.microsoft.com/office/powerpoint/2010/main" val="3498365790"/>
+      </p:ext>
+    </p:extLst>
+  </p:cSld>
+  <p:clrMapOvr>
+    <a:masterClrMapping/>
+  </p:clrMapOvr>
+</p:sld>
+</file>
+
+<file path=ppt/slides/slide21.xml><?xml version="1.0" encoding="utf-8"?>
+<p:sld xmlns:a="http://schemas.openxmlformats.org/drawingml/2006/main" xmlns:r="http://schemas.openxmlformats.org/officeDocument/2006/relationships" xmlns:p="http://schemas.openxmlformats.org/presentationml/2006/main">
+  <p:cSld>
+    <p:spTree>
+      <p:nvGrpSpPr>
+        <p:cNvPr id="1" name=""/>
+        <p:cNvGrpSpPr/>
+        <p:nvPr/>
+      </p:nvGrpSpPr>
+      <p:grpSpPr>
+        <a:xfrm>
+          <a:off x="0" y="0"/>
+          <a:ext cx="0" cy="0"/>
+          <a:chOff x="0" y="0"/>
+          <a:chExt cx="0" cy="0"/>
+        </a:xfrm>
+      </p:grpSpPr>
+      <p:sp>
+        <p:nvSpPr>
+          <p:cNvPr id="2" name="Title 1">
+            <a:extLst>
+              <a:ext uri="{FF2B5EF4-FFF2-40B4-BE49-F238E27FC236}">
+                <a16:creationId xmlns:a16="http://schemas.microsoft.com/office/drawing/2014/main" id="{0C842753-5915-4D30-92B9-291E1A04AEA0}"/>
+              </a:ext>
+            </a:extLst>
+          </p:cNvPr>
+          <p:cNvSpPr>
+            <a:spLocks noGrp="1"/>
+          </p:cNvSpPr>
+          <p:nvPr>
+            <p:ph type="title"/>
+          </p:nvPr>
+        </p:nvSpPr>
+        <p:spPr/>
+        <p:txBody>
+          <a:bodyPr/>
+          <a:lstStyle/>
+          <a:p>
+            <a:endParaRPr lang="LID4096" dirty="0"/>
+          </a:p>
+        </p:txBody>
+      </p:sp>
+      <p:sp>
+        <p:nvSpPr>
+          <p:cNvPr id="3" name="Content Placeholder 2">
+            <a:extLst>
+              <a:ext uri="{FF2B5EF4-FFF2-40B4-BE49-F238E27FC236}">
+                <a16:creationId xmlns:a16="http://schemas.microsoft.com/office/drawing/2014/main" id="{40754A61-8204-4730-8513-0E3E7F65AA9A}"/>
+              </a:ext>
+            </a:extLst>
+          </p:cNvPr>
+          <p:cNvSpPr>
+            <a:spLocks noGrp="1"/>
+          </p:cNvSpPr>
+          <p:nvPr>
+            <p:ph idx="1"/>
+          </p:nvPr>
+        </p:nvSpPr>
+        <p:spPr/>
+        <p:txBody>
+          <a:bodyPr/>
+          <a:lstStyle/>
+          <a:p>
+            <a:endParaRPr lang="LID4096"/>
+          </a:p>
+        </p:txBody>
+      </p:sp>
+    </p:spTree>
+    <p:extLst>
+      <p:ext uri="{BB962C8B-B14F-4D97-AF65-F5344CB8AC3E}">
+        <p14:creationId xmlns:p14="http://schemas.microsoft.com/office/powerpoint/2010/main" val="2866615341"/>
       </p:ext>
     </p:extLst>
   </p:cSld>

</xml_diff>

<commit_message>
added slides for query feature
</commit_message>
<xml_diff>
--- a/EngineeredMonitoringPlatform/docs/EMP_PresentationSlides.pptx
+++ b/EngineeredMonitoringPlatform/docs/EMP_PresentationSlides.pptx
@@ -25,6 +25,11 @@
     <p:sldId id="273" r:id="rId19"/>
     <p:sldId id="272" r:id="rId20"/>
     <p:sldId id="275" r:id="rId21"/>
+    <p:sldId id="277" r:id="rId22"/>
+    <p:sldId id="279" r:id="rId23"/>
+    <p:sldId id="280" r:id="rId24"/>
+    <p:sldId id="278" r:id="rId25"/>
+    <p:sldId id="281" r:id="rId26"/>
   </p:sldIdLst>
   <p:sldSz cx="12192000" cy="6858000"/>
   <p:notesSz cx="6858000" cy="9144000"/>
@@ -123,6 +128,11 @@
       </a:defRPr>
     </a:lvl9pPr>
   </p:defaultTextStyle>
+  <p:extLst>
+    <p:ext uri="{EFAFB233-063F-42B5-8137-9DF3F51BA10A}">
+      <p15:sldGuideLst xmlns:p15="http://schemas.microsoft.com/office/powerpoint/2012/main"/>
+    </p:ext>
+  </p:extLst>
 </p:presentation>
 </file>
 
@@ -275,7 +285,7 @@
           <a:p>
             <a:fld id="{CAE04C65-539E-4AD4-859E-8B7412D78289}" type="datetimeFigureOut">
               <a:rPr lang="LID4096" smtClean="0"/>
-              <a:t>10/10/2021</a:t>
+              <a:t>03/03/2022</a:t>
             </a:fld>
             <a:endParaRPr lang="LID4096"/>
           </a:p>
@@ -564,7 +574,7 @@
           <a:p>
             <a:fld id="{CAE04C65-539E-4AD4-859E-8B7412D78289}" type="datetimeFigureOut">
               <a:rPr lang="LID4096" smtClean="0"/>
-              <a:t>10/10/2021</a:t>
+              <a:t>03/03/2022</a:t>
             </a:fld>
             <a:endParaRPr lang="LID4096"/>
           </a:p>
@@ -773,7 +783,7 @@
           <a:p>
             <a:fld id="{CAE04C65-539E-4AD4-859E-8B7412D78289}" type="datetimeFigureOut">
               <a:rPr lang="LID4096" smtClean="0"/>
-              <a:t>10/10/2021</a:t>
+              <a:t>03/03/2022</a:t>
             </a:fld>
             <a:endParaRPr lang="LID4096"/>
           </a:p>
@@ -983,7 +993,7 @@
           <a:p>
             <a:fld id="{CAE04C65-539E-4AD4-859E-8B7412D78289}" type="datetimeFigureOut">
               <a:rPr lang="LID4096" smtClean="0"/>
-              <a:t>10/10/2021</a:t>
+              <a:t>03/03/2022</a:t>
             </a:fld>
             <a:endParaRPr lang="LID4096"/>
           </a:p>
@@ -1197,7 +1207,7 @@
           <a:p>
             <a:fld id="{CAE04C65-539E-4AD4-859E-8B7412D78289}" type="datetimeFigureOut">
               <a:rPr lang="LID4096" smtClean="0"/>
-              <a:t>10/10/2021</a:t>
+              <a:t>03/03/2022</a:t>
             </a:fld>
             <a:endParaRPr lang="LID4096"/>
           </a:p>
@@ -1387,7 +1397,7 @@
           <a:p>
             <a:fld id="{CAE04C65-539E-4AD4-859E-8B7412D78289}" type="datetimeFigureOut">
               <a:rPr lang="LID4096" smtClean="0"/>
-              <a:t>10/10/2021</a:t>
+              <a:t>03/03/2022</a:t>
             </a:fld>
             <a:endParaRPr lang="LID4096"/>
           </a:p>
@@ -1663,7 +1673,7 @@
           <a:p>
             <a:fld id="{CAE04C65-539E-4AD4-859E-8B7412D78289}" type="datetimeFigureOut">
               <a:rPr lang="LID4096" smtClean="0"/>
-              <a:t>10/10/2021</a:t>
+              <a:t>03/03/2022</a:t>
             </a:fld>
             <a:endParaRPr lang="LID4096"/>
           </a:p>
@@ -1940,7 +1950,7 @@
           <a:p>
             <a:fld id="{CAE04C65-539E-4AD4-859E-8B7412D78289}" type="datetimeFigureOut">
               <a:rPr lang="LID4096" smtClean="0"/>
-              <a:t>10/10/2021</a:t>
+              <a:t>03/03/2022</a:t>
             </a:fld>
             <a:endParaRPr lang="LID4096"/>
           </a:p>
@@ -2359,7 +2369,7 @@
           <a:p>
             <a:fld id="{CAE04C65-539E-4AD4-859E-8B7412D78289}" type="datetimeFigureOut">
               <a:rPr lang="LID4096" smtClean="0"/>
-              <a:t>10/10/2021</a:t>
+              <a:t>03/03/2022</a:t>
             </a:fld>
             <a:endParaRPr lang="LID4096"/>
           </a:p>
@@ -2510,7 +2520,7 @@
           <a:p>
             <a:fld id="{CAE04C65-539E-4AD4-859E-8B7412D78289}" type="datetimeFigureOut">
               <a:rPr lang="LID4096" smtClean="0"/>
-              <a:t>10/10/2021</a:t>
+              <a:t>03/03/2022</a:t>
             </a:fld>
             <a:endParaRPr lang="LID4096"/>
           </a:p>
@@ -2623,7 +2633,7 @@
           <a:p>
             <a:fld id="{CAE04C65-539E-4AD4-859E-8B7412D78289}" type="datetimeFigureOut">
               <a:rPr lang="LID4096" smtClean="0"/>
-              <a:t>10/10/2021</a:t>
+              <a:t>03/03/2022</a:t>
             </a:fld>
             <a:endParaRPr lang="LID4096"/>
           </a:p>
@@ -2936,7 +2946,7 @@
           <a:p>
             <a:fld id="{CAE04C65-539E-4AD4-859E-8B7412D78289}" type="datetimeFigureOut">
               <a:rPr lang="LID4096" smtClean="0"/>
-              <a:t>10/10/2021</a:t>
+              <a:t>03/03/2022</a:t>
             </a:fld>
             <a:endParaRPr lang="LID4096"/>
           </a:p>
@@ -3182,7 +3192,7 @@
           <a:p>
             <a:fld id="{CAE04C65-539E-4AD4-859E-8B7412D78289}" type="datetimeFigureOut">
               <a:rPr lang="LID4096" smtClean="0"/>
-              <a:t>10/10/2021</a:t>
+              <a:t>03/03/2022</a:t>
             </a:fld>
             <a:endParaRPr lang="LID4096"/>
           </a:p>
@@ -5035,6 +5045,748 @@
 </p:sld>
 </file>
 
+<file path=ppt/slides/slide21.xml><?xml version="1.0" encoding="utf-8"?>
+<p:sld xmlns:a="http://schemas.openxmlformats.org/drawingml/2006/main" xmlns:r="http://schemas.openxmlformats.org/officeDocument/2006/relationships" xmlns:p="http://schemas.openxmlformats.org/presentationml/2006/main">
+  <p:cSld>
+    <p:spTree>
+      <p:nvGrpSpPr>
+        <p:cNvPr id="1" name=""/>
+        <p:cNvGrpSpPr/>
+        <p:nvPr/>
+      </p:nvGrpSpPr>
+      <p:grpSpPr>
+        <a:xfrm>
+          <a:off x="0" y="0"/>
+          <a:ext cx="0" cy="0"/>
+          <a:chOff x="0" y="0"/>
+          <a:chExt cx="0" cy="0"/>
+        </a:xfrm>
+      </p:grpSpPr>
+      <p:sp>
+        <p:nvSpPr>
+          <p:cNvPr id="2" name="Title 1">
+            <a:extLst>
+              <a:ext uri="{FF2B5EF4-FFF2-40B4-BE49-F238E27FC236}">
+                <a16:creationId xmlns:a16="http://schemas.microsoft.com/office/drawing/2014/main" id="{A7586D44-EECA-4316-AFD9-18218DD93FC5}"/>
+              </a:ext>
+            </a:extLst>
+          </p:cNvPr>
+          <p:cNvSpPr>
+            <a:spLocks noGrp="1"/>
+          </p:cNvSpPr>
+          <p:nvPr>
+            <p:ph type="title"/>
+          </p:nvPr>
+        </p:nvSpPr>
+        <p:spPr/>
+        <p:txBody>
+          <a:bodyPr/>
+          <a:lstStyle/>
+          <a:p>
+            <a:r>
+              <a:rPr lang="en-US" dirty="0"/>
+              <a:t>Query Feature</a:t>
+            </a:r>
+            <a:endParaRPr lang="en-CH" dirty="0"/>
+          </a:p>
+        </p:txBody>
+      </p:sp>
+      <p:sp>
+        <p:nvSpPr>
+          <p:cNvPr id="3" name="Content Placeholder 2">
+            <a:extLst>
+              <a:ext uri="{FF2B5EF4-FFF2-40B4-BE49-F238E27FC236}">
+                <a16:creationId xmlns:a16="http://schemas.microsoft.com/office/drawing/2014/main" id="{274B9576-886E-4FFB-A78F-8B87E0DBB4C2}"/>
+              </a:ext>
+            </a:extLst>
+          </p:cNvPr>
+          <p:cNvSpPr>
+            <a:spLocks noGrp="1"/>
+          </p:cNvSpPr>
+          <p:nvPr>
+            <p:ph idx="1"/>
+          </p:nvPr>
+        </p:nvSpPr>
+        <p:spPr>
+          <a:xfrm>
+            <a:off x="838200" y="1320801"/>
+            <a:ext cx="10515600" cy="4914899"/>
+          </a:xfrm>
+        </p:spPr>
+        <p:txBody>
+          <a:bodyPr>
+            <a:normAutofit fontScale="92500" lnSpcReduction="20000"/>
+          </a:bodyPr>
+          <a:lstStyle/>
+          <a:p>
+            <a:r>
+              <a:rPr lang="en-US" dirty="0"/>
+              <a:t>The query feature gives you more flexibility on how you want to fetch and display the data in EMP. You can either use it to fetch data on the fly or display data on a dashboard. Features:</a:t>
+            </a:r>
+          </a:p>
+          <a:p>
+            <a:pPr marL="457200" indent="-457200">
+              <a:buFont typeface="Arial" panose="020B0604020202020204" pitchFamily="34" charset="0"/>
+              <a:buChar char="•"/>
+            </a:pPr>
+            <a:r>
+              <a:rPr lang="en-US" dirty="0"/>
+              <a:t>Various out of the box database sources (MySQL, MSSQL Oracle, any JDBC…)</a:t>
+            </a:r>
+          </a:p>
+          <a:p>
+            <a:pPr marL="457200" indent="-457200">
+              <a:buFont typeface="Arial" panose="020B0604020202020204" pitchFamily="34" charset="0"/>
+              <a:buChar char="•"/>
+            </a:pPr>
+            <a:r>
+              <a:rPr lang="en-US" dirty="0"/>
+              <a:t>Prometheus Source</a:t>
+            </a:r>
+          </a:p>
+          <a:p>
+            <a:pPr marL="457200" indent="-457200">
+              <a:buFont typeface="Arial" panose="020B0604020202020204" pitchFamily="34" charset="0"/>
+              <a:buChar char="•"/>
+            </a:pPr>
+            <a:r>
+              <a:rPr lang="en-US" dirty="0"/>
+              <a:t>Commands for filtering based on field values</a:t>
+            </a:r>
+          </a:p>
+          <a:p>
+            <a:pPr marL="457200" indent="-457200">
+              <a:buFont typeface="Arial" panose="020B0604020202020204" pitchFamily="34" charset="0"/>
+              <a:buChar char="•"/>
+            </a:pPr>
+            <a:r>
+              <a:rPr lang="en-US" dirty="0"/>
+              <a:t>Sorting of the data based on one or multiple field</a:t>
+            </a:r>
+          </a:p>
+          <a:p>
+            <a:pPr marL="457200" indent="-457200">
+              <a:buFont typeface="Arial" panose="020B0604020202020204" pitchFamily="34" charset="0"/>
+              <a:buChar char="•"/>
+            </a:pPr>
+            <a:r>
+              <a:rPr lang="en-US" dirty="0"/>
+              <a:t>Merging of data from multiple sources into one dataset</a:t>
+            </a:r>
+          </a:p>
+          <a:p>
+            <a:pPr marL="457200" indent="-457200">
+              <a:buFont typeface="Arial" panose="020B0604020202020204" pitchFamily="34" charset="0"/>
+              <a:buChar char="•"/>
+            </a:pPr>
+            <a:r>
+              <a:rPr lang="en-US" dirty="0"/>
+              <a:t>Deduplication by field values and keeping top &lt;n&gt; or last &lt;n&gt; records</a:t>
+            </a:r>
+          </a:p>
+          <a:p>
+            <a:pPr marL="457200" indent="-457200">
+              <a:buFont typeface="Arial" panose="020B0604020202020204" pitchFamily="34" charset="0"/>
+              <a:buChar char="•"/>
+            </a:pPr>
+            <a:r>
+              <a:rPr lang="en-US" dirty="0"/>
+              <a:t>Formatting of fields or records based on field values </a:t>
+            </a:r>
+          </a:p>
+          <a:p>
+            <a:pPr marL="457200" indent="-457200">
+              <a:buFont typeface="Arial" panose="020B0604020202020204" pitchFamily="34" charset="0"/>
+              <a:buChar char="•"/>
+            </a:pPr>
+            <a:r>
+              <a:rPr lang="en-US" dirty="0"/>
+              <a:t>Integrate the queries into dashboards using the Query Widget</a:t>
+            </a:r>
+          </a:p>
+          <a:p>
+            <a:pPr marL="457200" indent="-457200">
+              <a:buFont typeface="Arial" panose="020B0604020202020204" pitchFamily="34" charset="0"/>
+              <a:buChar char="•"/>
+            </a:pPr>
+            <a:r>
+              <a:rPr lang="en-US" dirty="0"/>
+              <a:t>Mass display of traffic lights</a:t>
+            </a:r>
+            <a:endParaRPr lang="en-CH" dirty="0"/>
+          </a:p>
+        </p:txBody>
+      </p:sp>
+    </p:spTree>
+    <p:extLst>
+      <p:ext uri="{BB962C8B-B14F-4D97-AF65-F5344CB8AC3E}">
+        <p14:creationId xmlns:p14="http://schemas.microsoft.com/office/powerpoint/2010/main" val="99721151"/>
+      </p:ext>
+    </p:extLst>
+  </p:cSld>
+  <p:clrMapOvr>
+    <a:masterClrMapping/>
+  </p:clrMapOvr>
+</p:sld>
+</file>
+
+<file path=ppt/slides/slide22.xml><?xml version="1.0" encoding="utf-8"?>
+<p:sld xmlns:a="http://schemas.openxmlformats.org/drawingml/2006/main" xmlns:r="http://schemas.openxmlformats.org/officeDocument/2006/relationships" xmlns:p="http://schemas.openxmlformats.org/presentationml/2006/main">
+  <p:cSld>
+    <p:spTree>
+      <p:nvGrpSpPr>
+        <p:cNvPr id="1" name=""/>
+        <p:cNvGrpSpPr/>
+        <p:nvPr/>
+      </p:nvGrpSpPr>
+      <p:grpSpPr>
+        <a:xfrm>
+          <a:off x="0" y="0"/>
+          <a:ext cx="0" cy="0"/>
+          <a:chOff x="0" y="0"/>
+          <a:chExt cx="0" cy="0"/>
+        </a:xfrm>
+      </p:grpSpPr>
+      <p:sp>
+        <p:nvSpPr>
+          <p:cNvPr id="2" name="Title 1">
+            <a:extLst>
+              <a:ext uri="{FF2B5EF4-FFF2-40B4-BE49-F238E27FC236}">
+                <a16:creationId xmlns:a16="http://schemas.microsoft.com/office/drawing/2014/main" id="{640606EA-B052-4986-9E62-6ACA495288FE}"/>
+              </a:ext>
+            </a:extLst>
+          </p:cNvPr>
+          <p:cNvSpPr>
+            <a:spLocks noGrp="1"/>
+          </p:cNvSpPr>
+          <p:nvPr>
+            <p:ph type="title"/>
+          </p:nvPr>
+        </p:nvSpPr>
+        <p:spPr/>
+        <p:txBody>
+          <a:bodyPr/>
+          <a:lstStyle/>
+          <a:p>
+            <a:r>
+              <a:rPr lang="en-US" dirty="0"/>
+              <a:t>Example – Fetch Data From Database</a:t>
+            </a:r>
+            <a:endParaRPr lang="en-CH" dirty="0"/>
+          </a:p>
+        </p:txBody>
+      </p:sp>
+      <p:sp>
+        <p:nvSpPr>
+          <p:cNvPr id="3" name="Content Placeholder 2">
+            <a:extLst>
+              <a:ext uri="{FF2B5EF4-FFF2-40B4-BE49-F238E27FC236}">
+                <a16:creationId xmlns:a16="http://schemas.microsoft.com/office/drawing/2014/main" id="{BF0741C9-90F7-49E1-9999-3F216DB04D68}"/>
+              </a:ext>
+            </a:extLst>
+          </p:cNvPr>
+          <p:cNvSpPr>
+            <a:spLocks noGrp="1"/>
+          </p:cNvSpPr>
+          <p:nvPr>
+            <p:ph idx="1"/>
+          </p:nvPr>
+        </p:nvSpPr>
+        <p:spPr/>
+        <p:txBody>
+          <a:bodyPr/>
+          <a:lstStyle/>
+          <a:p>
+            <a:r>
+              <a:rPr lang="en-US" dirty="0"/>
+              <a:t>Fetches data from a database and displays the data as table.</a:t>
+            </a:r>
+            <a:endParaRPr lang="en-CH" dirty="0"/>
+          </a:p>
+        </p:txBody>
+      </p:sp>
+      <p:pic>
+        <p:nvPicPr>
+          <p:cNvPr id="9" name="Picture 8">
+            <a:extLst>
+              <a:ext uri="{FF2B5EF4-FFF2-40B4-BE49-F238E27FC236}">
+                <a16:creationId xmlns:a16="http://schemas.microsoft.com/office/drawing/2014/main" id="{EC1EA80E-36ED-462E-AF59-5356E89542BF}"/>
+              </a:ext>
+            </a:extLst>
+          </p:cNvPr>
+          <p:cNvPicPr>
+            <a:picLocks noChangeAspect="1"/>
+          </p:cNvPicPr>
+          <p:nvPr/>
+        </p:nvPicPr>
+        <p:blipFill>
+          <a:blip r:embed="rId2"/>
+          <a:stretch>
+            <a:fillRect/>
+          </a:stretch>
+        </p:blipFill>
+        <p:spPr>
+          <a:xfrm>
+            <a:off x="1437524" y="2194986"/>
+            <a:ext cx="9147926" cy="4663014"/>
+          </a:xfrm>
+          <a:prstGeom prst="rect">
+            <a:avLst/>
+          </a:prstGeom>
+        </p:spPr>
+      </p:pic>
+    </p:spTree>
+    <p:extLst>
+      <p:ext uri="{BB962C8B-B14F-4D97-AF65-F5344CB8AC3E}">
+        <p14:creationId xmlns:p14="http://schemas.microsoft.com/office/powerpoint/2010/main" val="3073090357"/>
+      </p:ext>
+    </p:extLst>
+  </p:cSld>
+  <p:clrMapOvr>
+    <a:masterClrMapping/>
+  </p:clrMapOvr>
+</p:sld>
+</file>
+
+<file path=ppt/slides/slide23.xml><?xml version="1.0" encoding="utf-8"?>
+<p:sld xmlns:a="http://schemas.openxmlformats.org/drawingml/2006/main" xmlns:r="http://schemas.openxmlformats.org/officeDocument/2006/relationships" xmlns:p="http://schemas.openxmlformats.org/presentationml/2006/main">
+  <p:cSld>
+    <p:spTree>
+      <p:nvGrpSpPr>
+        <p:cNvPr id="1" name=""/>
+        <p:cNvGrpSpPr/>
+        <p:nvPr/>
+      </p:nvGrpSpPr>
+      <p:grpSpPr>
+        <a:xfrm>
+          <a:off x="0" y="0"/>
+          <a:ext cx="0" cy="0"/>
+          <a:chOff x="0" y="0"/>
+          <a:chExt cx="0" cy="0"/>
+        </a:xfrm>
+      </p:grpSpPr>
+      <p:sp>
+        <p:nvSpPr>
+          <p:cNvPr id="2" name="Title 1">
+            <a:extLst>
+              <a:ext uri="{FF2B5EF4-FFF2-40B4-BE49-F238E27FC236}">
+                <a16:creationId xmlns:a16="http://schemas.microsoft.com/office/drawing/2014/main" id="{B53864B2-4AB9-49D8-8013-C3F6ADB9C1C1}"/>
+              </a:ext>
+            </a:extLst>
+          </p:cNvPr>
+          <p:cNvSpPr>
+            <a:spLocks noGrp="1"/>
+          </p:cNvSpPr>
+          <p:nvPr>
+            <p:ph type="title"/>
+          </p:nvPr>
+        </p:nvSpPr>
+        <p:spPr>
+          <a:xfrm>
+            <a:off x="838200" y="365125"/>
+            <a:ext cx="7885566" cy="752475"/>
+          </a:xfrm>
+        </p:spPr>
+        <p:txBody>
+          <a:bodyPr>
+            <a:normAutofit fontScale="90000"/>
+          </a:bodyPr>
+          <a:lstStyle/>
+          <a:p>
+            <a:pPr algn="l"/>
+            <a:r>
+              <a:rPr lang="en-US" dirty="0"/>
+              <a:t>Example – Fetch from Prometheus</a:t>
+            </a:r>
+            <a:endParaRPr lang="en-CH" dirty="0"/>
+          </a:p>
+        </p:txBody>
+      </p:sp>
+      <p:sp>
+        <p:nvSpPr>
+          <p:cNvPr id="3" name="Content Placeholder 2">
+            <a:extLst>
+              <a:ext uri="{FF2B5EF4-FFF2-40B4-BE49-F238E27FC236}">
+                <a16:creationId xmlns:a16="http://schemas.microsoft.com/office/drawing/2014/main" id="{40F91D5A-43AA-4E10-9D36-CF013FCB93DD}"/>
+              </a:ext>
+            </a:extLst>
+          </p:cNvPr>
+          <p:cNvSpPr>
+            <a:spLocks noGrp="1"/>
+          </p:cNvSpPr>
+          <p:nvPr>
+            <p:ph idx="1"/>
+          </p:nvPr>
+        </p:nvSpPr>
+        <p:spPr>
+          <a:xfrm>
+            <a:off x="838200" y="1320801"/>
+            <a:ext cx="7359650" cy="1580944"/>
+          </a:xfrm>
+        </p:spPr>
+        <p:txBody>
+          <a:bodyPr>
+            <a:normAutofit lnSpcReduction="10000"/>
+          </a:bodyPr>
+          <a:lstStyle/>
+          <a:p>
+            <a:r>
+              <a:rPr lang="en-US" dirty="0"/>
+              <a:t>Fetch data with two different Prometheus queries from two different </a:t>
+            </a:r>
+            <a:r>
+              <a:rPr lang="en-US" dirty="0" err="1"/>
+              <a:t>prometheus</a:t>
+            </a:r>
+            <a:r>
+              <a:rPr lang="en-US" dirty="0"/>
+              <a:t> instances. Filter, sort and format by the field “value” and display the result as panels.</a:t>
+            </a:r>
+            <a:endParaRPr lang="en-CH" dirty="0"/>
+          </a:p>
+        </p:txBody>
+      </p:sp>
+      <p:pic>
+        <p:nvPicPr>
+          <p:cNvPr id="5" name="Picture 4">
+            <a:extLst>
+              <a:ext uri="{FF2B5EF4-FFF2-40B4-BE49-F238E27FC236}">
+                <a16:creationId xmlns:a16="http://schemas.microsoft.com/office/drawing/2014/main" id="{AB05D91A-B99C-4AD3-AA03-77DE922ECEB4}"/>
+              </a:ext>
+            </a:extLst>
+          </p:cNvPr>
+          <p:cNvPicPr>
+            <a:picLocks noChangeAspect="1"/>
+          </p:cNvPicPr>
+          <p:nvPr/>
+        </p:nvPicPr>
+        <p:blipFill>
+          <a:blip r:embed="rId2"/>
+          <a:stretch>
+            <a:fillRect/>
+          </a:stretch>
+        </p:blipFill>
+        <p:spPr>
+          <a:xfrm>
+            <a:off x="956739" y="3245912"/>
+            <a:ext cx="6778111" cy="2635454"/>
+          </a:xfrm>
+          <a:prstGeom prst="rect">
+            <a:avLst/>
+          </a:prstGeom>
+        </p:spPr>
+      </p:pic>
+      <p:pic>
+        <p:nvPicPr>
+          <p:cNvPr id="9" name="Picture 8">
+            <a:extLst>
+              <a:ext uri="{FF2B5EF4-FFF2-40B4-BE49-F238E27FC236}">
+                <a16:creationId xmlns:a16="http://schemas.microsoft.com/office/drawing/2014/main" id="{0A6CDAF2-8CE4-4821-AA03-70BF1497DF03}"/>
+              </a:ext>
+            </a:extLst>
+          </p:cNvPr>
+          <p:cNvPicPr>
+            <a:picLocks noChangeAspect="1"/>
+          </p:cNvPicPr>
+          <p:nvPr/>
+        </p:nvPicPr>
+        <p:blipFill>
+          <a:blip r:embed="rId3"/>
+          <a:stretch>
+            <a:fillRect/>
+          </a:stretch>
+        </p:blipFill>
+        <p:spPr>
+          <a:xfrm>
+            <a:off x="8524413" y="-13062"/>
+            <a:ext cx="4610823" cy="6858000"/>
+          </a:xfrm>
+          <a:prstGeom prst="rect">
+            <a:avLst/>
+          </a:prstGeom>
+        </p:spPr>
+      </p:pic>
+    </p:spTree>
+    <p:extLst>
+      <p:ext uri="{BB962C8B-B14F-4D97-AF65-F5344CB8AC3E}">
+        <p14:creationId xmlns:p14="http://schemas.microsoft.com/office/powerpoint/2010/main" val="609745034"/>
+      </p:ext>
+    </p:extLst>
+  </p:cSld>
+  <p:clrMapOvr>
+    <a:masterClrMapping/>
+  </p:clrMapOvr>
+</p:sld>
+</file>
+
+<file path=ppt/slides/slide24.xml><?xml version="1.0" encoding="utf-8"?>
+<p:sld xmlns:a="http://schemas.openxmlformats.org/drawingml/2006/main" xmlns:r="http://schemas.openxmlformats.org/officeDocument/2006/relationships" xmlns:p="http://schemas.openxmlformats.org/presentationml/2006/main">
+  <p:cSld>
+    <p:spTree>
+      <p:nvGrpSpPr>
+        <p:cNvPr id="1" name=""/>
+        <p:cNvGrpSpPr/>
+        <p:nvPr/>
+      </p:nvGrpSpPr>
+      <p:grpSpPr>
+        <a:xfrm>
+          <a:off x="0" y="0"/>
+          <a:ext cx="0" cy="0"/>
+          <a:chOff x="0" y="0"/>
+          <a:chExt cx="0" cy="0"/>
+        </a:xfrm>
+      </p:grpSpPr>
+      <p:sp>
+        <p:nvSpPr>
+          <p:cNvPr id="2" name="Title 1">
+            <a:extLst>
+              <a:ext uri="{FF2B5EF4-FFF2-40B4-BE49-F238E27FC236}">
+                <a16:creationId xmlns:a16="http://schemas.microsoft.com/office/drawing/2014/main" id="{1A48B704-594D-4CE1-8C3B-5EAC7C5F03A6}"/>
+              </a:ext>
+            </a:extLst>
+          </p:cNvPr>
+          <p:cNvSpPr>
+            <a:spLocks noGrp="1"/>
+          </p:cNvSpPr>
+          <p:nvPr>
+            <p:ph type="title"/>
+          </p:nvPr>
+        </p:nvSpPr>
+        <p:spPr/>
+        <p:txBody>
+          <a:bodyPr/>
+          <a:lstStyle/>
+          <a:p>
+            <a:r>
+              <a:rPr lang="en-US" dirty="0"/>
+              <a:t>Example - Format</a:t>
+            </a:r>
+            <a:endParaRPr lang="en-CH" dirty="0"/>
+          </a:p>
+        </p:txBody>
+      </p:sp>
+      <p:sp>
+        <p:nvSpPr>
+          <p:cNvPr id="3" name="Content Placeholder 2">
+            <a:extLst>
+              <a:ext uri="{FF2B5EF4-FFF2-40B4-BE49-F238E27FC236}">
+                <a16:creationId xmlns:a16="http://schemas.microsoft.com/office/drawing/2014/main" id="{8ABB42C9-39CD-487D-9BEE-AFC8655570CB}"/>
+              </a:ext>
+            </a:extLst>
+          </p:cNvPr>
+          <p:cNvSpPr>
+            <a:spLocks noGrp="1"/>
+          </p:cNvSpPr>
+          <p:nvPr>
+            <p:ph idx="1"/>
+          </p:nvPr>
+        </p:nvSpPr>
+        <p:spPr/>
+        <p:txBody>
+          <a:bodyPr/>
+          <a:lstStyle/>
+          <a:p>
+            <a:r>
+              <a:rPr lang="en-US" dirty="0"/>
+              <a:t>Show records as traffic lights based on field values.</a:t>
+            </a:r>
+            <a:endParaRPr lang="en-CH" dirty="0"/>
+          </a:p>
+        </p:txBody>
+      </p:sp>
+      <p:pic>
+        <p:nvPicPr>
+          <p:cNvPr id="7" name="Picture 6">
+            <a:extLst>
+              <a:ext uri="{FF2B5EF4-FFF2-40B4-BE49-F238E27FC236}">
+                <a16:creationId xmlns:a16="http://schemas.microsoft.com/office/drawing/2014/main" id="{1F2C98FB-B744-402A-81F8-C360DDFF2473}"/>
+              </a:ext>
+            </a:extLst>
+          </p:cNvPr>
+          <p:cNvPicPr>
+            <a:picLocks noChangeAspect="1"/>
+          </p:cNvPicPr>
+          <p:nvPr/>
+        </p:nvPicPr>
+        <p:blipFill>
+          <a:blip r:embed="rId2"/>
+          <a:stretch>
+            <a:fillRect/>
+          </a:stretch>
+        </p:blipFill>
+        <p:spPr>
+          <a:xfrm>
+            <a:off x="4805341" y="2276476"/>
+            <a:ext cx="6726259" cy="4010023"/>
+          </a:xfrm>
+          <a:prstGeom prst="rect">
+            <a:avLst/>
+          </a:prstGeom>
+        </p:spPr>
+      </p:pic>
+      <p:pic>
+        <p:nvPicPr>
+          <p:cNvPr id="9" name="Picture 8">
+            <a:extLst>
+              <a:ext uri="{FF2B5EF4-FFF2-40B4-BE49-F238E27FC236}">
+                <a16:creationId xmlns:a16="http://schemas.microsoft.com/office/drawing/2014/main" id="{B559597C-4528-417D-AA8B-6A743F209691}"/>
+              </a:ext>
+            </a:extLst>
+          </p:cNvPr>
+          <p:cNvPicPr>
+            <a:picLocks noChangeAspect="1"/>
+          </p:cNvPicPr>
+          <p:nvPr/>
+        </p:nvPicPr>
+        <p:blipFill>
+          <a:blip r:embed="rId3"/>
+          <a:stretch>
+            <a:fillRect/>
+          </a:stretch>
+        </p:blipFill>
+        <p:spPr>
+          <a:xfrm>
+            <a:off x="838200" y="2276476"/>
+            <a:ext cx="3760047" cy="4010023"/>
+          </a:xfrm>
+          <a:prstGeom prst="rect">
+            <a:avLst/>
+          </a:prstGeom>
+        </p:spPr>
+      </p:pic>
+    </p:spTree>
+    <p:extLst>
+      <p:ext uri="{BB962C8B-B14F-4D97-AF65-F5344CB8AC3E}">
+        <p14:creationId xmlns:p14="http://schemas.microsoft.com/office/powerpoint/2010/main" val="4235682211"/>
+      </p:ext>
+    </p:extLst>
+  </p:cSld>
+  <p:clrMapOvr>
+    <a:masterClrMapping/>
+  </p:clrMapOvr>
+</p:sld>
+</file>
+
+<file path=ppt/slides/slide25.xml><?xml version="1.0" encoding="utf-8"?>
+<p:sld xmlns:a="http://schemas.openxmlformats.org/drawingml/2006/main" xmlns:r="http://schemas.openxmlformats.org/officeDocument/2006/relationships" xmlns:p="http://schemas.openxmlformats.org/presentationml/2006/main">
+  <p:cSld>
+    <p:spTree>
+      <p:nvGrpSpPr>
+        <p:cNvPr id="1" name=""/>
+        <p:cNvGrpSpPr/>
+        <p:nvPr/>
+      </p:nvGrpSpPr>
+      <p:grpSpPr>
+        <a:xfrm>
+          <a:off x="0" y="0"/>
+          <a:ext cx="0" cy="0"/>
+          <a:chOff x="0" y="0"/>
+          <a:chExt cx="0" cy="0"/>
+        </a:xfrm>
+      </p:grpSpPr>
+      <p:sp>
+        <p:nvSpPr>
+          <p:cNvPr id="2" name="Title 1">
+            <a:extLst>
+              <a:ext uri="{FF2B5EF4-FFF2-40B4-BE49-F238E27FC236}">
+                <a16:creationId xmlns:a16="http://schemas.microsoft.com/office/drawing/2014/main" id="{A8BFE8D1-2656-4D55-B23C-7228FA743196}"/>
+              </a:ext>
+            </a:extLst>
+          </p:cNvPr>
+          <p:cNvSpPr>
+            <a:spLocks noGrp="1"/>
+          </p:cNvSpPr>
+          <p:nvPr>
+            <p:ph type="title"/>
+          </p:nvPr>
+        </p:nvSpPr>
+        <p:spPr/>
+        <p:txBody>
+          <a:bodyPr/>
+          <a:lstStyle/>
+          <a:p>
+            <a:r>
+              <a:rPr lang="en-US" dirty="0"/>
+              <a:t>Example –Dashboard Widget with Parameters</a:t>
+            </a:r>
+            <a:endParaRPr lang="en-CH" dirty="0"/>
+          </a:p>
+        </p:txBody>
+      </p:sp>
+      <p:sp>
+        <p:nvSpPr>
+          <p:cNvPr id="3" name="Content Placeholder 2">
+            <a:extLst>
+              <a:ext uri="{FF2B5EF4-FFF2-40B4-BE49-F238E27FC236}">
+                <a16:creationId xmlns:a16="http://schemas.microsoft.com/office/drawing/2014/main" id="{0A425075-3083-4C08-9A0E-A1DE3A4D6342}"/>
+              </a:ext>
+            </a:extLst>
+          </p:cNvPr>
+          <p:cNvSpPr>
+            <a:spLocks noGrp="1"/>
+          </p:cNvSpPr>
+          <p:nvPr>
+            <p:ph idx="1"/>
+          </p:nvPr>
+        </p:nvSpPr>
+        <p:spPr/>
+        <p:txBody>
+          <a:bodyPr>
+            <a:normAutofit fontScale="92500" lnSpcReduction="10000"/>
+          </a:bodyPr>
+          <a:lstStyle/>
+          <a:p>
+            <a:r>
+              <a:rPr lang="en-US" dirty="0"/>
+              <a:t>Add queries to dashboards and use the dashboard parameter feature to customize your query.</a:t>
+            </a:r>
+            <a:endParaRPr lang="en-CH" dirty="0"/>
+          </a:p>
+        </p:txBody>
+      </p:sp>
+      <p:pic>
+        <p:nvPicPr>
+          <p:cNvPr id="7" name="Picture 6">
+            <a:extLst>
+              <a:ext uri="{FF2B5EF4-FFF2-40B4-BE49-F238E27FC236}">
+                <a16:creationId xmlns:a16="http://schemas.microsoft.com/office/drawing/2014/main" id="{1F5A427E-4B35-421D-8621-525DBD1FC382}"/>
+              </a:ext>
+            </a:extLst>
+          </p:cNvPr>
+          <p:cNvPicPr>
+            <a:picLocks noChangeAspect="1"/>
+          </p:cNvPicPr>
+          <p:nvPr/>
+        </p:nvPicPr>
+        <p:blipFill>
+          <a:blip r:embed="rId2"/>
+          <a:stretch>
+            <a:fillRect/>
+          </a:stretch>
+        </p:blipFill>
+        <p:spPr>
+          <a:xfrm>
+            <a:off x="1031387" y="2162360"/>
+            <a:ext cx="10129225" cy="4479740"/>
+          </a:xfrm>
+          <a:prstGeom prst="rect">
+            <a:avLst/>
+          </a:prstGeom>
+        </p:spPr>
+      </p:pic>
+    </p:spTree>
+    <p:extLst>
+      <p:ext uri="{BB962C8B-B14F-4D97-AF65-F5344CB8AC3E}">
+        <p14:creationId xmlns:p14="http://schemas.microsoft.com/office/powerpoint/2010/main" val="3728745337"/>
+      </p:ext>
+    </p:extLst>
+  </p:cSld>
+  <p:clrMapOvr>
+    <a:masterClrMapping/>
+  </p:clrMapOvr>
+</p:sld>
+</file>
+
 <file path=ppt/slides/slide3.xml><?xml version="1.0" encoding="utf-8"?>
 <p:sld xmlns:a="http://schemas.openxmlformats.org/drawingml/2006/main" xmlns:r="http://schemas.openxmlformats.org/officeDocument/2006/relationships" xmlns:p="http://schemas.openxmlformats.org/presentationml/2006/main">
   <p:cSld>

</xml_diff>